<commit_message>
Colombia shapefile from R
</commit_message>
<xml_diff>
--- a/Workshop_big_data_urosario_2017.pptx
+++ b/Workshop_big_data_urosario_2017.pptx
@@ -5551,7 +5551,7 @@
         <p:spPr>
           <a:xfrm>
             <a:off x="1456151" y="1938606"/>
-            <a:ext cx="1227387" cy="369332"/>
+            <a:ext cx="1316194" cy="369332"/>
           </a:xfrm>
           <a:prstGeom prst="rect">
             <a:avLst/>
@@ -5564,16 +5564,12 @@
           <a:lstStyle/>
           <a:p>
             <a:r>
-              <a:rPr lang="en-US" dirty="0"/>
-              <a:t>[.</a:t>
-            </a:r>
-            <a:r>
-              <a:rPr lang="en-US" dirty="0" err="1"/>
-              <a:t>wth</a:t>
+              <a:rPr lang="en-US" dirty="0" smtClean="0"/>
+              <a:t>[.WTH </a:t>
             </a:r>
             <a:r>
               <a:rPr lang="en-US" dirty="0"/>
-              <a:t> files] </a:t>
+              <a:t>files] </a:t>
             </a:r>
           </a:p>
         </p:txBody>
@@ -5661,7 +5657,7 @@
         <p:spPr>
           <a:xfrm>
             <a:off x="965880" y="3389448"/>
-            <a:ext cx="1188146" cy="369332"/>
+            <a:ext cx="1226618" cy="369332"/>
           </a:xfrm>
           <a:prstGeom prst="rect">
             <a:avLst/>
@@ -5674,8 +5670,12 @@
           <a:lstStyle/>
           <a:p>
             <a:r>
+              <a:rPr lang="en-US" dirty="0" smtClean="0"/>
+              <a:t>[.SOL </a:t>
+            </a:r>
+            <a:r>
               <a:rPr lang="en-US" dirty="0"/>
-              <a:t>[.soil files] </a:t>
+              <a:t>files] </a:t>
             </a:r>
           </a:p>
         </p:txBody>
@@ -5859,7 +5859,7 @@
         <p:spPr>
           <a:xfrm>
             <a:off x="2387221" y="4901780"/>
-            <a:ext cx="970137" cy="369332"/>
+            <a:ext cx="990977" cy="369332"/>
           </a:xfrm>
           <a:prstGeom prst="rect">
             <a:avLst/>
@@ -5872,8 +5872,12 @@
           <a:lstStyle/>
           <a:p>
             <a:r>
+              <a:rPr lang="en-US" dirty="0" smtClean="0"/>
+              <a:t>[.X </a:t>
+            </a:r>
+            <a:r>
               <a:rPr lang="en-US" dirty="0"/>
-              <a:t>[.x files] </a:t>
+              <a:t>files] </a:t>
             </a:r>
           </a:p>
         </p:txBody>
@@ -6198,29 +6202,8 @@
                   <a:srgbClr val="BB3A26"/>
                 </a:solidFill>
               </a:rPr>
-              <a:t>Decision Support System for </a:t>
+              <a:t>Decision Support System for Agrotechnology Transfer</a:t>
             </a:r>
-            <a:r>
-              <a:rPr lang="en-US" altLang="es-CO" sz="2400" b="1" dirty="0" err="1">
-                <a:solidFill>
-                  <a:srgbClr val="BB3A26"/>
-                </a:solidFill>
-              </a:rPr>
-              <a:t>Agrotechnology</a:t>
-            </a:r>
-            <a:r>
-              <a:rPr lang="en-US" altLang="es-CO" sz="2400" b="1" dirty="0">
-                <a:solidFill>
-                  <a:srgbClr val="BB3A26"/>
-                </a:solidFill>
-              </a:rPr>
-              <a:t> Transfer</a:t>
-            </a:r>
-            <a:endParaRPr lang="en-US" altLang="es-CO" sz="2400" b="1" dirty="0">
-              <a:solidFill>
-                <a:srgbClr val="BB3A26"/>
-              </a:solidFill>
-            </a:endParaRPr>
           </a:p>
         </p:txBody>
       </p:sp>
@@ -8457,18 +8440,18 @@
 </file>
 
 <file path=customXml/item2.xml><?xml version="1.0" encoding="utf-8"?>
+<p:properties xmlns:p="http://schemas.microsoft.com/office/2006/metadata/properties" xmlns:xsi="http://www.w3.org/2001/XMLSchema-instance" xmlns:pc="http://schemas.microsoft.com/office/infopath/2007/PartnerControls">
+  <documentManagement/>
+</p:properties>
+</file>
+
+<file path=customXml/item3.xml><?xml version="1.0" encoding="utf-8"?>
 <?mso-contentType ?>
 <FormTemplates xmlns="http://schemas.microsoft.com/sharepoint/v3/contenttype/forms">
   <Display>DocumentLibraryForm</Display>
   <Edit>DocumentLibraryForm</Edit>
   <New>DocumentLibraryForm</New>
 </FormTemplates>
-</file>
-
-<file path=customXml/item3.xml><?xml version="1.0" encoding="utf-8"?>
-<p:properties xmlns:p="http://schemas.microsoft.com/office/2006/metadata/properties" xmlns:xsi="http://www.w3.org/2001/XMLSchema-instance" xmlns:pc="http://schemas.microsoft.com/office/infopath/2007/PartnerControls">
-  <documentManagement/>
-</p:properties>
 </file>
 
 <file path=customXml/itemProps1.xml><?xml version="1.0" encoding="utf-8"?>
@@ -8490,14 +8473,6 @@
 </file>
 
 <file path=customXml/itemProps2.xml><?xml version="1.0" encoding="utf-8"?>
-<ds:datastoreItem xmlns:ds="http://schemas.openxmlformats.org/officeDocument/2006/customXml" ds:itemID="{8DD53AFE-922E-4F6F-BEA2-E05F55A5131F}">
-  <ds:schemaRefs>
-    <ds:schemaRef ds:uri="http://schemas.microsoft.com/sharepoint/v3/contenttype/forms"/>
-  </ds:schemaRefs>
-</ds:datastoreItem>
-</file>
-
-<file path=customXml/itemProps3.xml><?xml version="1.0" encoding="utf-8"?>
 <ds:datastoreItem xmlns:ds="http://schemas.openxmlformats.org/officeDocument/2006/customXml" ds:itemID="{861B9C8C-05BA-4A9C-9B1B-FBE6DEF552B2}">
   <ds:schemaRefs>
     <ds:schemaRef ds:uri="http://schemas.microsoft.com/office/infopath/2007/PartnerControls"/>
@@ -8511,4 +8486,12 @@
     <ds:schemaRef ds:uri="http://purl.org/dc/terms/"/>
   </ds:schemaRefs>
 </ds:datastoreItem>
+</file>
+
+<file path=customXml/itemProps3.xml><?xml version="1.0" encoding="utf-8"?>
+<ds:datastoreItem xmlns:ds="http://schemas.openxmlformats.org/officeDocument/2006/customXml" ds:itemID="{8DD53AFE-922E-4F6F-BEA2-E05F55A5131F}">
+  <ds:schemaRefs>
+    <ds:schemaRef ds:uri="http://schemas.microsoft.com/sharepoint/v3/contenttype/forms"/>
+  </ds:schemaRefs>
+</ds:datastoreItem>
 </file>
</xml_diff>